<commit_message>
Curriculum R2 (for Spec v1.0) RELEASED.
</commit_message>
<xml_diff>
--- a/RC/supplemental_diagram.pptx
+++ b/RC/supplemental_diagram.pptx
@@ -107,6 +107,11 @@
       </a:defRPr>
     </a:lvl9pPr>
   </p:defaultTextStyle>
+  <p:extLst>
+    <p:ext uri="{EFAFB233-063F-42B5-8137-9DF3F51BA10A}">
+      <p15:sldGuideLst xmlns:p15="http://schemas.microsoft.com/office/powerpoint/2012/main"/>
+    </p:ext>
+  </p:extLst>
 </p:presentation>
 </file>
 
@@ -198,7 +203,7 @@
           <a:p>
             <a:fld id="{1EA42524-38D3-429D-887F-5D5960347BD0}" type="datetimeFigureOut">
               <a:rPr kumimoji="1" lang="ja-JP" altLang="en-US" smtClean="0"/>
-              <a:t>2017/10/13</a:t>
+              <a:t>2017/10/23</a:t>
             </a:fld>
             <a:endParaRPr kumimoji="1" lang="ja-JP" altLang="en-US"/>
           </a:p>
@@ -1124,7 +1129,7 @@
             <a:fld id="{846CE7D5-CF57-46EF-B807-FDD0502418D4}" type="datetimeFigureOut">
               <a:rPr lang="en-US" smtClean="0"/>
               <a:pPr/>
-              <a:t>10/13/2017</a:t>
+              <a:t>10/23/2017</a:t>
             </a:fld>
             <a:endParaRPr lang="en-US"/>
           </a:p>
@@ -1381,7 +1386,7 @@
             <a:fld id="{846CE7D5-CF57-46EF-B807-FDD0502418D4}" type="datetimeFigureOut">
               <a:rPr lang="en-US" smtClean="0"/>
               <a:pPr/>
-              <a:t>10/13/2017</a:t>
+              <a:t>10/23/2017</a:t>
             </a:fld>
             <a:endParaRPr lang="en-US"/>
           </a:p>
@@ -1597,7 +1602,7 @@
             <a:fld id="{846CE7D5-CF57-46EF-B807-FDD0502418D4}" type="datetimeFigureOut">
               <a:rPr lang="en-US" smtClean="0"/>
               <a:pPr/>
-              <a:t>10/13/2017</a:t>
+              <a:t>10/23/2017</a:t>
             </a:fld>
             <a:endParaRPr lang="en-US"/>
           </a:p>
@@ -2494,7 +2499,7 @@
             <a:fld id="{846CE7D5-CF57-46EF-B807-FDD0502418D4}" type="datetimeFigureOut">
               <a:rPr lang="en-US" smtClean="0"/>
               <a:pPr/>
-              <a:t>10/13/2017</a:t>
+              <a:t>10/23/2017</a:t>
             </a:fld>
             <a:endParaRPr lang="en-US"/>
           </a:p>
@@ -2783,7 +2788,7 @@
             <a:fld id="{846CE7D5-CF57-46EF-B807-FDD0502418D4}" type="datetimeFigureOut">
               <a:rPr lang="en-US" smtClean="0"/>
               <a:pPr/>
-              <a:t>10/13/2017</a:t>
+              <a:t>10/23/2017</a:t>
             </a:fld>
             <a:endParaRPr lang="en-US"/>
           </a:p>
@@ -3111,7 +3116,7 @@
             <a:fld id="{846CE7D5-CF57-46EF-B807-FDD0502418D4}" type="datetimeFigureOut">
               <a:rPr lang="en-US" smtClean="0"/>
               <a:pPr/>
-              <a:t>10/13/2017</a:t>
+              <a:t>10/23/2017</a:t>
             </a:fld>
             <a:endParaRPr lang="en-US"/>
           </a:p>
@@ -3618,7 +3623,7 @@
             <a:fld id="{846CE7D5-CF57-46EF-B807-FDD0502418D4}" type="datetimeFigureOut">
               <a:rPr lang="en-US" smtClean="0"/>
               <a:pPr/>
-              <a:t>10/13/2017</a:t>
+              <a:t>10/23/2017</a:t>
             </a:fld>
             <a:endParaRPr lang="en-US"/>
           </a:p>
@@ -3806,7 +3811,7 @@
             <a:fld id="{846CE7D5-CF57-46EF-B807-FDD0502418D4}" type="datetimeFigureOut">
               <a:rPr lang="en-US" smtClean="0"/>
               <a:pPr/>
-              <a:t>10/13/2017</a:t>
+              <a:t>10/23/2017</a:t>
             </a:fld>
             <a:endParaRPr lang="en-US"/>
           </a:p>
@@ -3937,7 +3942,7 @@
             <a:fld id="{846CE7D5-CF57-46EF-B807-FDD0502418D4}" type="datetimeFigureOut">
               <a:rPr lang="en-US" smtClean="0"/>
               <a:pPr/>
-              <a:t>10/13/2017</a:t>
+              <a:t>10/23/2017</a:t>
             </a:fld>
             <a:endParaRPr lang="en-US"/>
           </a:p>
@@ -4252,7 +4257,7 @@
             <a:fld id="{846CE7D5-CF57-46EF-B807-FDD0502418D4}" type="datetimeFigureOut">
               <a:rPr lang="en-US" smtClean="0"/>
               <a:pPr/>
-              <a:t>10/13/2017</a:t>
+              <a:t>10/23/2017</a:t>
             </a:fld>
             <a:endParaRPr lang="en-US"/>
           </a:p>
@@ -4598,7 +4603,7 @@
             <a:fld id="{846CE7D5-CF57-46EF-B807-FDD0502418D4}" type="datetimeFigureOut">
               <a:rPr lang="en-US" smtClean="0"/>
               <a:pPr/>
-              <a:t>10/13/2017</a:t>
+              <a:t>10/23/2017</a:t>
             </a:fld>
             <a:endParaRPr lang="en-US"/>
           </a:p>
@@ -4945,7 +4950,7 @@
             <a:fld id="{846CE7D5-CF57-46EF-B807-FDD0502418D4}" type="datetimeFigureOut">
               <a:rPr kumimoji="0" lang="en-US" smtClean="0"/>
               <a:pPr/>
-              <a:t>10/13/2017</a:t>
+              <a:t>10/23/2017</a:t>
             </a:fld>
             <a:endParaRPr kumimoji="0" lang="en-US"/>
           </a:p>
@@ -5397,7 +5402,8 @@
                 <a:solidFill>
                   <a:srgbClr val="292934"/>
                 </a:solidFill>
-                <a:latin typeface="Calibri" charset="0"/>
+                <a:latin typeface="ＭＳ ゴシック" panose="020B0609070205080204" pitchFamily="49" charset="-128"/>
+                <a:ea typeface="ＭＳ ゴシック" panose="020B0609070205080204" pitchFamily="49" charset="-128"/>
               </a:rPr>
               <a:t>入</a:t>
             </a:r>
@@ -5406,7 +5412,8 @@
                 <a:solidFill>
                   <a:srgbClr val="292934"/>
                 </a:solidFill>
-                <a:latin typeface="Calibri" charset="0"/>
+                <a:latin typeface="ＭＳ ゴシック" panose="020B0609070205080204" pitchFamily="49" charset="-128"/>
+                <a:ea typeface="ＭＳ ゴシック" panose="020B0609070205080204" pitchFamily="49" charset="-128"/>
               </a:rPr>
               <a:t>力</a:t>
             </a:r>
@@ -5415,7 +5422,8 @@
                 <a:solidFill>
                   <a:srgbClr val="000000"/>
                 </a:solidFill>
-                <a:latin typeface="Calibri" charset="0"/>
+                <a:latin typeface="ＭＳ ゴシック" panose="020B0609070205080204" pitchFamily="49" charset="-128"/>
+                <a:ea typeface="ＭＳ ゴシック" panose="020B0609070205080204" pitchFamily="49" charset="-128"/>
               </a:rPr>
               <a:t>：FOSS</a:t>
             </a:r>
@@ -5423,7 +5431,8 @@
               <a:solidFill>
                 <a:srgbClr val="000000"/>
               </a:solidFill>
-              <a:latin typeface="Calibri" charset="0"/>
+              <a:latin typeface="ＭＳ ゴシック" panose="020B0609070205080204" pitchFamily="49" charset="-128"/>
+              <a:ea typeface="ＭＳ ゴシック" panose="020B0609070205080204" pitchFamily="49" charset="-128"/>
             </a:endParaRPr>
           </a:p>
         </p:txBody>
@@ -5470,7 +5479,8 @@
                 <a:solidFill>
                   <a:srgbClr val="292934"/>
                 </a:solidFill>
-                <a:latin typeface="Calibri" charset="0"/>
+                <a:latin typeface="ＭＳ ゴシック" panose="020B0609070205080204" pitchFamily="49" charset="-128"/>
+                <a:ea typeface="ＭＳ ゴシック" panose="020B0609070205080204" pitchFamily="49" charset="-128"/>
               </a:rPr>
               <a:t>出</a:t>
             </a:r>
@@ -5479,7 +5489,8 @@
                 <a:solidFill>
                   <a:srgbClr val="292934"/>
                 </a:solidFill>
-                <a:latin typeface="Calibri" charset="0"/>
+                <a:latin typeface="ＭＳ ゴシック" panose="020B0609070205080204" pitchFamily="49" charset="-128"/>
+                <a:ea typeface="ＭＳ ゴシック" panose="020B0609070205080204" pitchFamily="49" charset="-128"/>
               </a:rPr>
               <a:t>力：</a:t>
             </a:r>
@@ -5488,7 +5499,8 @@
                 <a:solidFill>
                   <a:srgbClr val="000000"/>
                 </a:solidFill>
-                <a:latin typeface="Calibri" charset="0"/>
+                <a:latin typeface="ＭＳ ゴシック" panose="020B0609070205080204" pitchFamily="49" charset="-128"/>
+                <a:ea typeface="ＭＳ ゴシック" panose="020B0609070205080204" pitchFamily="49" charset="-128"/>
               </a:rPr>
               <a:t> </a:t>
             </a:r>
@@ -5504,7 +5516,8 @@
                 <a:solidFill>
                   <a:srgbClr val="000000"/>
                 </a:solidFill>
-                <a:latin typeface="Calibri" charset="0"/>
+                <a:latin typeface="ＭＳ ゴシック" panose="020B0609070205080204" pitchFamily="49" charset="-128"/>
+                <a:ea typeface="ＭＳ ゴシック" panose="020B0609070205080204" pitchFamily="49" charset="-128"/>
               </a:rPr>
               <a:t>FOSS </a:t>
             </a:r>
@@ -5513,24 +5526,17 @@
                 <a:solidFill>
                   <a:srgbClr val="000000"/>
                 </a:solidFill>
-                <a:latin typeface="Calibri" charset="0"/>
-              </a:rPr>
-              <a:t>+ </a:t>
-            </a:r>
-            <a:r>
-              <a:rPr kumimoji="0" lang="en-US" sz="1100" b="1">
-                <a:solidFill>
-                  <a:srgbClr val="000000"/>
-                </a:solidFill>
-                <a:latin typeface="Calibri" charset="0"/>
-              </a:rPr>
-              <a:t>改変</a:t>
+                <a:latin typeface="ＭＳ ゴシック" panose="020B0609070205080204" pitchFamily="49" charset="-128"/>
+                <a:ea typeface="ＭＳ ゴシック" panose="020B0609070205080204" pitchFamily="49" charset="-128"/>
+              </a:rPr>
+              <a:t>+ 改変</a:t>
             </a:r>
             <a:endParaRPr kumimoji="0" lang="en-US" sz="1100" b="1" dirty="0">
               <a:solidFill>
                 <a:srgbClr val="000000"/>
               </a:solidFill>
-              <a:latin typeface="Calibri" charset="0"/>
+              <a:latin typeface="ＭＳ ゴシック" panose="020B0609070205080204" pitchFamily="49" charset="-128"/>
+              <a:ea typeface="ＭＳ ゴシック" panose="020B0609070205080204" pitchFamily="49" charset="-128"/>
             </a:endParaRPr>
           </a:p>
         </p:txBody>
@@ -5744,7 +5750,8 @@
                 <a:solidFill>
                   <a:srgbClr val="000000"/>
                 </a:solidFill>
-                <a:latin typeface="Calibri" charset="0"/>
+                <a:latin typeface="ＭＳ ゴシック" panose="020B0609070205080204" pitchFamily="49" charset="-128"/>
+                <a:ea typeface="ＭＳ ゴシック" panose="020B0609070205080204" pitchFamily="49" charset="-128"/>
               </a:rPr>
               <a:t>監査</a:t>
             </a:r>
@@ -5756,24 +5763,17 @@
                 <a:solidFill>
                   <a:srgbClr val="000000"/>
                 </a:solidFill>
-                <a:latin typeface="Calibri" charset="0"/>
-              </a:rPr>
-              <a:t>（</a:t>
-            </a:r>
-            <a:r>
-              <a:rPr kumimoji="0" lang="en-US" sz="1100" b="1">
-                <a:solidFill>
-                  <a:srgbClr val="000000"/>
-                </a:solidFill>
-                <a:latin typeface="Calibri" charset="0"/>
-              </a:rPr>
-              <a:t>Audit）</a:t>
+                <a:latin typeface="ＭＳ ゴシック" panose="020B0609070205080204" pitchFamily="49" charset="-128"/>
+                <a:ea typeface="ＭＳ ゴシック" panose="020B0609070205080204" pitchFamily="49" charset="-128"/>
+              </a:rPr>
+              <a:t>（Audit）</a:t>
             </a:r>
             <a:endParaRPr kumimoji="0" lang="en-US" sz="1100" b="1" i="1">
               <a:solidFill>
                 <a:srgbClr val="000000"/>
               </a:solidFill>
-              <a:latin typeface="Calibri" charset="0"/>
+              <a:latin typeface="ＭＳ ゴシック" panose="020B0609070205080204" pitchFamily="49" charset="-128"/>
+              <a:ea typeface="ＭＳ ゴシック" panose="020B0609070205080204" pitchFamily="49" charset="-128"/>
             </a:endParaRPr>
           </a:p>
         </p:txBody>
@@ -5818,7 +5818,8 @@
                 <a:solidFill>
                   <a:srgbClr val="000000"/>
                 </a:solidFill>
-                <a:latin typeface="Calibri" charset="0"/>
+                <a:latin typeface="ＭＳ ゴシック" panose="020B0609070205080204" pitchFamily="49" charset="-128"/>
+                <a:ea typeface="ＭＳ ゴシック" panose="020B0609070205080204" pitchFamily="49" charset="-128"/>
               </a:rPr>
               <a:t>問題の解決</a:t>
             </a:r>
@@ -5830,24 +5831,17 @@
                 <a:solidFill>
                   <a:srgbClr val="000000"/>
                 </a:solidFill>
-                <a:latin typeface="Calibri" charset="0"/>
-              </a:rPr>
-              <a:t>（</a:t>
-            </a:r>
-            <a:r>
-              <a:rPr kumimoji="0" lang="en-US" sz="1100" b="1">
-                <a:solidFill>
-                  <a:srgbClr val="000000"/>
-                </a:solidFill>
-                <a:latin typeface="Calibri" charset="0"/>
-              </a:rPr>
-              <a:t>Resolve Issue）</a:t>
+                <a:latin typeface="ＭＳ ゴシック" panose="020B0609070205080204" pitchFamily="49" charset="-128"/>
+                <a:ea typeface="ＭＳ ゴシック" panose="020B0609070205080204" pitchFamily="49" charset="-128"/>
+              </a:rPr>
+              <a:t>（Resolve Issue）</a:t>
             </a:r>
             <a:endParaRPr kumimoji="0" lang="en-US" sz="1100" b="1" i="1">
               <a:solidFill>
                 <a:srgbClr val="000000"/>
               </a:solidFill>
-              <a:latin typeface="Calibri" charset="0"/>
+              <a:latin typeface="ＭＳ ゴシック" panose="020B0609070205080204" pitchFamily="49" charset="-128"/>
+              <a:ea typeface="ＭＳ ゴシック" panose="020B0609070205080204" pitchFamily="49" charset="-128"/>
             </a:endParaRPr>
           </a:p>
         </p:txBody>
@@ -5892,7 +5886,8 @@
                 <a:solidFill>
                   <a:srgbClr val="000000"/>
                 </a:solidFill>
-                <a:latin typeface="Calibri" charset="0"/>
+                <a:latin typeface="ＭＳ ゴシック" panose="020B0609070205080204" pitchFamily="49" charset="-128"/>
+                <a:ea typeface="ＭＳ ゴシック" panose="020B0609070205080204" pitchFamily="49" charset="-128"/>
               </a:rPr>
               <a:t>レビュー</a:t>
             </a:r>
@@ -5904,24 +5899,17 @@
                 <a:solidFill>
                   <a:srgbClr val="000000"/>
                 </a:solidFill>
-                <a:latin typeface="Calibri" charset="0"/>
-              </a:rPr>
-              <a:t>（</a:t>
-            </a:r>
-            <a:r>
-              <a:rPr kumimoji="0" lang="en-US" sz="1100" b="1">
-                <a:solidFill>
-                  <a:srgbClr val="000000"/>
-                </a:solidFill>
-                <a:latin typeface="Calibri" charset="0"/>
-              </a:rPr>
-              <a:t>Review）</a:t>
+                <a:latin typeface="ＭＳ ゴシック" panose="020B0609070205080204" pitchFamily="49" charset="-128"/>
+                <a:ea typeface="ＭＳ ゴシック" panose="020B0609070205080204" pitchFamily="49" charset="-128"/>
+              </a:rPr>
+              <a:t>（Review）</a:t>
             </a:r>
             <a:endParaRPr kumimoji="0" lang="en-US" sz="1100" b="1" i="1">
               <a:solidFill>
                 <a:srgbClr val="000000"/>
               </a:solidFill>
-              <a:latin typeface="Calibri" charset="0"/>
+              <a:latin typeface="ＭＳ ゴシック" panose="020B0609070205080204" pitchFamily="49" charset="-128"/>
+              <a:ea typeface="ＭＳ ゴシック" panose="020B0609070205080204" pitchFamily="49" charset="-128"/>
             </a:endParaRPr>
           </a:p>
         </p:txBody>
@@ -5966,7 +5954,8 @@
                 <a:solidFill>
                   <a:srgbClr val="000000"/>
                 </a:solidFill>
-                <a:latin typeface="Calibri" charset="0"/>
+                <a:latin typeface="ＭＳ ゴシック" panose="020B0609070205080204" pitchFamily="49" charset="-128"/>
+                <a:ea typeface="ＭＳ ゴシック" panose="020B0609070205080204" pitchFamily="49" charset="-128"/>
               </a:rPr>
               <a:t>承認</a:t>
             </a:r>
@@ -5978,24 +5967,17 @@
                 <a:solidFill>
                   <a:srgbClr val="000000"/>
                 </a:solidFill>
-                <a:latin typeface="Calibri" charset="0"/>
-              </a:rPr>
-              <a:t>（</a:t>
-            </a:r>
-            <a:r>
-              <a:rPr kumimoji="0" lang="en-US" sz="1100" b="1">
-                <a:solidFill>
-                  <a:srgbClr val="000000"/>
-                </a:solidFill>
-                <a:latin typeface="Calibri" charset="0"/>
-              </a:rPr>
-              <a:t>Approval）</a:t>
+                <a:latin typeface="ＭＳ ゴシック" panose="020B0609070205080204" pitchFamily="49" charset="-128"/>
+                <a:ea typeface="ＭＳ ゴシック" panose="020B0609070205080204" pitchFamily="49" charset="-128"/>
+              </a:rPr>
+              <a:t>（Approval）</a:t>
             </a:r>
             <a:endParaRPr kumimoji="0" lang="en-US" sz="1100" b="1" i="1">
               <a:solidFill>
                 <a:srgbClr val="000000"/>
               </a:solidFill>
-              <a:latin typeface="Calibri" charset="0"/>
+              <a:latin typeface="ＭＳ ゴシック" panose="020B0609070205080204" pitchFamily="49" charset="-128"/>
+              <a:ea typeface="ＭＳ ゴシック" panose="020B0609070205080204" pitchFamily="49" charset="-128"/>
             </a:endParaRPr>
           </a:p>
         </p:txBody>
@@ -6040,7 +6022,8 @@
                 <a:solidFill>
                   <a:srgbClr val="000000"/>
                 </a:solidFill>
-                <a:latin typeface="Calibri" charset="0"/>
+                <a:latin typeface="ＭＳ ゴシック" panose="020B0609070205080204" pitchFamily="49" charset="-128"/>
+                <a:ea typeface="ＭＳ ゴシック" panose="020B0609070205080204" pitchFamily="49" charset="-128"/>
               </a:rPr>
               <a:t>登録</a:t>
             </a:r>
@@ -6052,24 +6035,17 @@
                 <a:solidFill>
                   <a:srgbClr val="000000"/>
                 </a:solidFill>
-                <a:latin typeface="Calibri" charset="0"/>
-              </a:rPr>
-              <a:t>（</a:t>
-            </a:r>
-            <a:r>
-              <a:rPr kumimoji="0" lang="en-US" sz="1100" b="1">
-                <a:solidFill>
-                  <a:srgbClr val="000000"/>
-                </a:solidFill>
-                <a:latin typeface="Calibri" charset="0"/>
-              </a:rPr>
-              <a:t>Registration）</a:t>
+                <a:latin typeface="ＭＳ ゴシック" panose="020B0609070205080204" pitchFamily="49" charset="-128"/>
+                <a:ea typeface="ＭＳ ゴシック" panose="020B0609070205080204" pitchFamily="49" charset="-128"/>
+              </a:rPr>
+              <a:t>（Registration）</a:t>
             </a:r>
             <a:endParaRPr kumimoji="0" lang="en-US" sz="1100" b="1" i="1">
               <a:solidFill>
                 <a:srgbClr val="000000"/>
               </a:solidFill>
-              <a:latin typeface="Calibri" charset="0"/>
+              <a:latin typeface="ＭＳ ゴシック" panose="020B0609070205080204" pitchFamily="49" charset="-128"/>
+              <a:ea typeface="ＭＳ ゴシック" panose="020B0609070205080204" pitchFamily="49" charset="-128"/>
             </a:endParaRPr>
           </a:p>
         </p:txBody>
@@ -6114,7 +6090,8 @@
                 <a:solidFill>
                   <a:srgbClr val="000000"/>
                 </a:solidFill>
-                <a:latin typeface="Calibri" charset="0"/>
+                <a:latin typeface="ＭＳ ゴシック" panose="020B0609070205080204" pitchFamily="49" charset="-128"/>
+                <a:ea typeface="ＭＳ ゴシック" panose="020B0609070205080204" pitchFamily="49" charset="-128"/>
               </a:rPr>
               <a:t>告知／通知／表示（Notice）</a:t>
             </a:r>
@@ -6122,7 +6099,8 @@
               <a:solidFill>
                 <a:srgbClr val="000000"/>
               </a:solidFill>
-              <a:latin typeface="Calibri" charset="0"/>
+              <a:latin typeface="ＭＳ ゴシック" panose="020B0609070205080204" pitchFamily="49" charset="-128"/>
+              <a:ea typeface="ＭＳ ゴシック" panose="020B0609070205080204" pitchFamily="49" charset="-128"/>
             </a:endParaRPr>
           </a:p>
         </p:txBody>
@@ -6167,7 +6145,8 @@
                 <a:solidFill>
                   <a:srgbClr val="000000"/>
                 </a:solidFill>
-                <a:latin typeface="Calibri" charset="0"/>
+                <a:latin typeface="ＭＳ ゴシック" panose="020B0609070205080204" pitchFamily="49" charset="-128"/>
+                <a:ea typeface="ＭＳ ゴシック" panose="020B0609070205080204" pitchFamily="49" charset="-128"/>
               </a:rPr>
               <a:t>検証</a:t>
             </a:r>
@@ -6179,24 +6158,17 @@
                 <a:solidFill>
                   <a:srgbClr val="000000"/>
                 </a:solidFill>
-                <a:latin typeface="Calibri" charset="0"/>
-              </a:rPr>
-              <a:t>（</a:t>
-            </a:r>
-            <a:r>
-              <a:rPr kumimoji="0" lang="en-US" sz="1100" b="1">
-                <a:solidFill>
-                  <a:srgbClr val="000000"/>
-                </a:solidFill>
-                <a:latin typeface="Calibri" charset="0"/>
-              </a:rPr>
-              <a:t>Verification）</a:t>
+                <a:latin typeface="ＭＳ ゴシック" panose="020B0609070205080204" pitchFamily="49" charset="-128"/>
+                <a:ea typeface="ＭＳ ゴシック" panose="020B0609070205080204" pitchFamily="49" charset="-128"/>
+              </a:rPr>
+              <a:t>（Verification）</a:t>
             </a:r>
             <a:endParaRPr kumimoji="0" lang="en-US" sz="1100" b="1" i="1">
               <a:solidFill>
                 <a:srgbClr val="000000"/>
               </a:solidFill>
-              <a:latin typeface="Calibri" charset="0"/>
+              <a:latin typeface="ＭＳ ゴシック" panose="020B0609070205080204" pitchFamily="49" charset="-128"/>
+              <a:ea typeface="ＭＳ ゴシック" panose="020B0609070205080204" pitchFamily="49" charset="-128"/>
             </a:endParaRPr>
           </a:p>
         </p:txBody>
@@ -6241,7 +6213,8 @@
                 <a:solidFill>
                   <a:srgbClr val="000000"/>
                 </a:solidFill>
-                <a:latin typeface="Calibri" charset="0"/>
+                <a:latin typeface="ＭＳ ゴシック" panose="020B0609070205080204" pitchFamily="49" charset="-128"/>
+                <a:ea typeface="ＭＳ ゴシック" panose="020B0609070205080204" pitchFamily="49" charset="-128"/>
               </a:rPr>
               <a:t>頒布</a:t>
             </a:r>
@@ -6253,24 +6226,17 @@
                 <a:solidFill>
                   <a:srgbClr val="000000"/>
                 </a:solidFill>
-                <a:latin typeface="Calibri" charset="0"/>
-              </a:rPr>
-              <a:t>（</a:t>
-            </a:r>
-            <a:r>
-              <a:rPr kumimoji="0" lang="en-US" sz="1100" b="1">
-                <a:solidFill>
-                  <a:srgbClr val="000000"/>
-                </a:solidFill>
-                <a:latin typeface="Calibri" charset="0"/>
-              </a:rPr>
-              <a:t>Distribution）</a:t>
+                <a:latin typeface="ＭＳ ゴシック" panose="020B0609070205080204" pitchFamily="49" charset="-128"/>
+                <a:ea typeface="ＭＳ ゴシック" panose="020B0609070205080204" pitchFamily="49" charset="-128"/>
+              </a:rPr>
+              <a:t>（Distribution）</a:t>
             </a:r>
             <a:endParaRPr kumimoji="0" lang="en-US" sz="1100" b="1" i="1">
               <a:solidFill>
                 <a:srgbClr val="000000"/>
               </a:solidFill>
-              <a:latin typeface="Calibri" charset="0"/>
+              <a:latin typeface="ＭＳ ゴシック" panose="020B0609070205080204" pitchFamily="49" charset="-128"/>
+              <a:ea typeface="ＭＳ ゴシック" panose="020B0609070205080204" pitchFamily="49" charset="-128"/>
             </a:endParaRPr>
           </a:p>
         </p:txBody>
@@ -6315,7 +6281,8 @@
                 <a:solidFill>
                   <a:srgbClr val="000000"/>
                 </a:solidFill>
-                <a:latin typeface="Calibri" charset="0"/>
+                <a:latin typeface="ＭＳ ゴシック" panose="020B0609070205080204" pitchFamily="49" charset="-128"/>
+                <a:ea typeface="ＭＳ ゴシック" panose="020B0609070205080204" pitchFamily="49" charset="-128"/>
               </a:rPr>
               <a:t>検証</a:t>
             </a:r>
@@ -6327,24 +6294,17 @@
                 <a:solidFill>
                   <a:srgbClr val="000000"/>
                 </a:solidFill>
-                <a:latin typeface="Calibri" charset="0"/>
-              </a:rPr>
-              <a:t>（</a:t>
-            </a:r>
-            <a:r>
-              <a:rPr kumimoji="0" lang="en-US" sz="1100" b="1">
-                <a:solidFill>
-                  <a:srgbClr val="000000"/>
-                </a:solidFill>
-                <a:latin typeface="Calibri" charset="0"/>
-              </a:rPr>
-              <a:t>Verification）</a:t>
+                <a:latin typeface="ＭＳ ゴシック" panose="020B0609070205080204" pitchFamily="49" charset="-128"/>
+                <a:ea typeface="ＭＳ ゴシック" panose="020B0609070205080204" pitchFamily="49" charset="-128"/>
+              </a:rPr>
+              <a:t>（Verification）</a:t>
             </a:r>
             <a:endParaRPr kumimoji="0" lang="en-US" sz="1100" b="1" i="1">
               <a:solidFill>
                 <a:srgbClr val="000000"/>
               </a:solidFill>
-              <a:latin typeface="Calibri" charset="0"/>
+              <a:latin typeface="ＭＳ ゴシック" panose="020B0609070205080204" pitchFamily="49" charset="-128"/>
+              <a:ea typeface="ＭＳ ゴシック" panose="020B0609070205080204" pitchFamily="49" charset="-128"/>
             </a:endParaRPr>
           </a:p>
         </p:txBody>
@@ -6447,8 +6407,8 @@
         </p:nvSpPr>
         <p:spPr bwMode="auto">
           <a:xfrm rot="10800000">
-            <a:off x="3302578" y="2856891"/>
-            <a:ext cx="523220" cy="1332000"/>
+            <a:off x="3217940" y="2856891"/>
+            <a:ext cx="692497" cy="1332000"/>
           </a:xfrm>
           <a:prstGeom prst="rect">
             <a:avLst/>
@@ -6477,7 +6437,8 @@
                 <a:solidFill>
                   <a:srgbClr val="000000"/>
                 </a:solidFill>
-                <a:latin typeface="Calibri" charset="0"/>
+                <a:latin typeface="ＭＳ ゴシック" panose="020B0609070205080204" pitchFamily="49" charset="-128"/>
+                <a:ea typeface="ＭＳ ゴシック" panose="020B0609070205080204" pitchFamily="49" charset="-128"/>
               </a:rPr>
               <a:t>確認</a:t>
             </a:r>
@@ -6489,7 +6450,8 @@
                 <a:solidFill>
                   <a:srgbClr val="000000"/>
                 </a:solidFill>
-                <a:latin typeface="Calibri" charset="0"/>
+                <a:latin typeface="ＭＳ ゴシック" panose="020B0609070205080204" pitchFamily="49" charset="-128"/>
+                <a:ea typeface="ＭＳ ゴシック" panose="020B0609070205080204" pitchFamily="49" charset="-128"/>
               </a:rPr>
               <a:t>（</a:t>
             </a:r>
@@ -6498,7 +6460,8 @@
                 <a:solidFill>
                   <a:srgbClr val="000000"/>
                 </a:solidFill>
-                <a:latin typeface="Calibri" charset="0"/>
+                <a:latin typeface="ＭＳ ゴシック" panose="020B0609070205080204" pitchFamily="49" charset="-128"/>
+                <a:ea typeface="ＭＳ ゴシック" panose="020B0609070205080204" pitchFamily="49" charset="-128"/>
               </a:rPr>
               <a:t>Identification</a:t>
             </a:r>
@@ -6507,7 +6470,8 @@
                 <a:solidFill>
                   <a:srgbClr val="000000"/>
                 </a:solidFill>
-                <a:latin typeface="Calibri" charset="0"/>
+                <a:latin typeface="ＭＳ ゴシック" panose="020B0609070205080204" pitchFamily="49" charset="-128"/>
+                <a:ea typeface="ＭＳ ゴシック" panose="020B0609070205080204" pitchFamily="49" charset="-128"/>
               </a:rPr>
               <a:t>）</a:t>
             </a:r>
@@ -6515,7 +6479,8 @@
               <a:solidFill>
                 <a:srgbClr val="000000"/>
               </a:solidFill>
-              <a:latin typeface="Calibri" charset="0"/>
+              <a:latin typeface="ＭＳ ゴシック" panose="020B0609070205080204" pitchFamily="49" charset="-128"/>
+              <a:ea typeface="ＭＳ ゴシック" panose="020B0609070205080204" pitchFamily="49" charset="-128"/>
             </a:endParaRPr>
           </a:p>
         </p:txBody>
@@ -6954,34 +6919,18 @@
                   <a:srgbClr val="000000"/>
                 </a:solidFill>
               </a:rPr>
-              <a:t>告知／通知／</a:t>
-            </a:r>
+              <a:t>告知／通知／表示</a:t>
+            </a:r>
+          </a:p>
+          <a:p>
+            <a:pPr algn="ctr"/>
             <a:r>
               <a:rPr kumimoji="0" lang="en-US" sz="1000" b="1">
                 <a:solidFill>
                   <a:srgbClr val="000000"/>
                 </a:solidFill>
               </a:rPr>
-              <a:t>表示</a:t>
-            </a:r>
-          </a:p>
-          <a:p>
-            <a:pPr algn="ctr"/>
-            <a:r>
-              <a:rPr kumimoji="0" lang="en-US" sz="1000" b="1">
-                <a:solidFill>
-                  <a:srgbClr val="000000"/>
-                </a:solidFill>
-              </a:rPr>
-              <a:t>（</a:t>
-            </a:r>
-            <a:r>
-              <a:rPr kumimoji="0" lang="en-US" sz="1000" b="1">
-                <a:solidFill>
-                  <a:srgbClr val="000000"/>
-                </a:solidFill>
-              </a:rPr>
-              <a:t>Notice）</a:t>
+              <a:t>（Notice）</a:t>
             </a:r>
           </a:p>
         </p:txBody>

</xml_diff>